<commit_message>
PPT for Group Presentation
</commit_message>
<xml_diff>
--- a/CIS434 Project Presentation.pptx
+++ b/CIS434 Project Presentation.pptx
@@ -7241,7 +7241,7 @@
           <a:p>
             <a:r>
               <a:rPr lang="en-US" dirty="0"/>
-              <a:t>[More Games]</a:t>
+              <a:t>[Series Over]</a:t>
             </a:r>
           </a:p>
         </p:txBody>
@@ -7348,8 +7348,8 @@
         </p:nvSpPr>
         <p:spPr>
           <a:xfrm>
-            <a:off x="9050550" y="3073767"/>
-            <a:ext cx="1454914" cy="369332"/>
+            <a:off x="8813923" y="2958827"/>
+            <a:ext cx="1687679" cy="646331"/>
           </a:xfrm>
           <a:prstGeom prst="rect">
             <a:avLst/>
@@ -7362,9 +7362,17 @@
           </a:bodyPr>
           <a:lstStyle/>
           <a:p>
+            <a:pPr algn="ctr"/>
             <a:r>
               <a:rPr lang="en-US" dirty="0"/>
-              <a:t>Play Match</a:t>
+              <a:t>Play Next</a:t>
+            </a:r>
+          </a:p>
+          <a:p>
+            <a:pPr algn="ctr"/>
+            <a:r>
+              <a:rPr lang="en-US" dirty="0"/>
+              <a:t>Match</a:t>
             </a:r>
           </a:p>
         </p:txBody>
@@ -7383,7 +7391,7 @@
         </p:nvSpPr>
         <p:spPr>
           <a:xfrm>
-            <a:off x="8323870" y="2864061"/>
+            <a:off x="7124264" y="3471805"/>
             <a:ext cx="623707" cy="369332"/>
           </a:xfrm>
           <a:prstGeom prst="rect">
@@ -7418,7 +7426,7 @@
         </p:nvSpPr>
         <p:spPr>
           <a:xfrm>
-            <a:off x="7064585" y="3458517"/>
+            <a:off x="8327814" y="2912660"/>
             <a:ext cx="623707" cy="369332"/>
           </a:xfrm>
           <a:prstGeom prst="rect">

</xml_diff>